<commit_message>
Fixed typo in figure
</commit_message>
<xml_diff>
--- a/StudentGuideModule1/newtons_laws/truck_mosquito.pptx
+++ b/StudentGuideModule1/newtons_laws/truck_mosquito.pptx
@@ -208,7 +208,7 @@
           <a:p>
             <a:fld id="{6153122F-3E6A-46AA-B1CE-6E6A82958A78}" type="datetimeFigureOut">
               <a:rPr lang="en-US" smtClean="0"/>
-              <a:t>10/5/2019</a:t>
+              <a:t>12/4/2019</a:t>
             </a:fld>
             <a:endParaRPr lang="en-US"/>
           </a:p>
@@ -739,7 +739,7 @@
           <a:p>
             <a:fld id="{2B81A30E-FEA9-42C1-95AD-B75AE3EF8DCE}" type="datetimeFigureOut">
               <a:rPr lang="en-US" smtClean="0"/>
-              <a:t>10/5/2019</a:t>
+              <a:t>12/4/2019</a:t>
             </a:fld>
             <a:endParaRPr lang="en-US"/>
           </a:p>
@@ -907,7 +907,7 @@
           <a:p>
             <a:fld id="{2B81A30E-FEA9-42C1-95AD-B75AE3EF8DCE}" type="datetimeFigureOut">
               <a:rPr lang="en-US" smtClean="0"/>
-              <a:t>10/5/2019</a:t>
+              <a:t>12/4/2019</a:t>
             </a:fld>
             <a:endParaRPr lang="en-US"/>
           </a:p>
@@ -1085,7 +1085,7 @@
           <a:p>
             <a:fld id="{2B81A30E-FEA9-42C1-95AD-B75AE3EF8DCE}" type="datetimeFigureOut">
               <a:rPr lang="en-US" smtClean="0"/>
-              <a:t>10/5/2019</a:t>
+              <a:t>12/4/2019</a:t>
             </a:fld>
             <a:endParaRPr lang="en-US"/>
           </a:p>
@@ -1253,7 +1253,7 @@
           <a:p>
             <a:fld id="{2B81A30E-FEA9-42C1-95AD-B75AE3EF8DCE}" type="datetimeFigureOut">
               <a:rPr lang="en-US" smtClean="0"/>
-              <a:t>10/5/2019</a:t>
+              <a:t>12/4/2019</a:t>
             </a:fld>
             <a:endParaRPr lang="en-US"/>
           </a:p>
@@ -1498,7 +1498,7 @@
           <a:p>
             <a:fld id="{2B81A30E-FEA9-42C1-95AD-B75AE3EF8DCE}" type="datetimeFigureOut">
               <a:rPr lang="en-US" smtClean="0"/>
-              <a:t>10/5/2019</a:t>
+              <a:t>12/4/2019</a:t>
             </a:fld>
             <a:endParaRPr lang="en-US"/>
           </a:p>
@@ -1783,7 +1783,7 @@
           <a:p>
             <a:fld id="{2B81A30E-FEA9-42C1-95AD-B75AE3EF8DCE}" type="datetimeFigureOut">
               <a:rPr lang="en-US" smtClean="0"/>
-              <a:t>10/5/2019</a:t>
+              <a:t>12/4/2019</a:t>
             </a:fld>
             <a:endParaRPr lang="en-US"/>
           </a:p>
@@ -2202,7 +2202,7 @@
           <a:p>
             <a:fld id="{2B81A30E-FEA9-42C1-95AD-B75AE3EF8DCE}" type="datetimeFigureOut">
               <a:rPr lang="en-US" smtClean="0"/>
-              <a:t>10/5/2019</a:t>
+              <a:t>12/4/2019</a:t>
             </a:fld>
             <a:endParaRPr lang="en-US"/>
           </a:p>
@@ -2319,7 +2319,7 @@
           <a:p>
             <a:fld id="{2B81A30E-FEA9-42C1-95AD-B75AE3EF8DCE}" type="datetimeFigureOut">
               <a:rPr lang="en-US" smtClean="0"/>
-              <a:t>10/5/2019</a:t>
+              <a:t>12/4/2019</a:t>
             </a:fld>
             <a:endParaRPr lang="en-US"/>
           </a:p>
@@ -2414,7 +2414,7 @@
           <a:p>
             <a:fld id="{2B81A30E-FEA9-42C1-95AD-B75AE3EF8DCE}" type="datetimeFigureOut">
               <a:rPr lang="en-US" smtClean="0"/>
-              <a:t>10/5/2019</a:t>
+              <a:t>12/4/2019</a:t>
             </a:fld>
             <a:endParaRPr lang="en-US"/>
           </a:p>
@@ -2689,7 +2689,7 @@
           <a:p>
             <a:fld id="{2B81A30E-FEA9-42C1-95AD-B75AE3EF8DCE}" type="datetimeFigureOut">
               <a:rPr lang="en-US" smtClean="0"/>
-              <a:t>10/5/2019</a:t>
+              <a:t>12/4/2019</a:t>
             </a:fld>
             <a:endParaRPr lang="en-US"/>
           </a:p>
@@ -2941,7 +2941,7 @@
           <a:p>
             <a:fld id="{2B81A30E-FEA9-42C1-95AD-B75AE3EF8DCE}" type="datetimeFigureOut">
               <a:rPr lang="en-US" smtClean="0"/>
-              <a:t>10/5/2019</a:t>
+              <a:t>12/4/2019</a:t>
             </a:fld>
             <a:endParaRPr lang="en-US"/>
           </a:p>
@@ -3152,7 +3152,7 @@
           <a:p>
             <a:fld id="{2B81A30E-FEA9-42C1-95AD-B75AE3EF8DCE}" type="datetimeFigureOut">
               <a:rPr lang="en-US" smtClean="0"/>
-              <a:t>10/5/2019</a:t>
+              <a:t>12/4/2019</a:t>
             </a:fld>
             <a:endParaRPr lang="en-US"/>
           </a:p>
@@ -3642,8 +3642,8 @@
           </a:p>
         </p:txBody>
       </p:sp>
-      <mc:AlternateContent xmlns:mc="http://schemas.openxmlformats.org/markup-compatibility/2006">
-        <mc:Choice xmlns:a14="http://schemas.microsoft.com/office/drawing/2010/main" Requires="a14">
+      <mc:AlternateContent xmlns:mc="http://schemas.openxmlformats.org/markup-compatibility/2006" xmlns:a14="http://schemas.microsoft.com/office/drawing/2010/main">
+        <mc:Choice Requires="a14">
           <p:sp>
             <p:nvSpPr>
               <p:cNvPr id="5" name="TextBox 4"/>
@@ -3709,7 +3709,7 @@
             </p:txBody>
           </p:sp>
         </mc:Choice>
-        <mc:Fallback>
+        <mc:Fallback xmlns="">
           <p:sp>
             <p:nvSpPr>
               <p:cNvPr id="5" name="TextBox 4"/>
@@ -3787,8 +3787,8 @@
           </a:fontRef>
         </p:style>
       </p:cxnSp>
-      <mc:AlternateContent xmlns:mc="http://schemas.openxmlformats.org/markup-compatibility/2006">
-        <mc:Choice xmlns:a14="http://schemas.microsoft.com/office/drawing/2010/main" Requires="a14">
+      <mc:AlternateContent xmlns:mc="http://schemas.openxmlformats.org/markup-compatibility/2006" xmlns:a14="http://schemas.microsoft.com/office/drawing/2010/main">
+        <mc:Choice Requires="a14">
           <p:sp>
             <p:nvSpPr>
               <p:cNvPr id="11" name="TextBox 10"/>
@@ -3847,7 +3847,7 @@
             </p:txBody>
           </p:sp>
         </mc:Choice>
-        <mc:Fallback>
+        <mc:Fallback xmlns="">
           <p:sp>
             <p:nvSpPr>
               <p:cNvPr id="11" name="TextBox 10"/>
@@ -3899,7 +3899,7 @@
             </p:nvSpPr>
             <p:spPr>
               <a:xfrm>
-                <a:off x="4135497" y="2783437"/>
+                <a:off x="4198362" y="2783437"/>
                 <a:ext cx="561620" cy="261610"/>
               </a:xfrm>
               <a:prstGeom prst="rect">
@@ -3923,12 +3923,6 @@
                       <m:jc m:val="centerGroup"/>
                     </m:oMathParaPr>
                     <m:oMath xmlns:m="http://schemas.openxmlformats.org/officeDocument/2006/math">
-                      <m:r>
-                        <a:rPr lang="en-US" sz="1100" b="0" i="1" smtClean="0">
-                          <a:latin typeface="Cambria Math"/>
-                        </a:rPr>
-                        <m:t>−</m:t>
-                      </m:r>
                       <m:acc>
                         <m:accPr>
                           <m:chr m:val="⃗"/>
@@ -3972,7 +3966,7 @@
             </p:nvSpPr>
             <p:spPr>
               <a:xfrm>
-                <a:off x="4135497" y="2783437"/>
+                <a:off x="4198362" y="2783437"/>
                 <a:ext cx="561620" cy="261610"/>
               </a:xfrm>
               <a:prstGeom prst="rect">
@@ -4115,8 +4109,8 @@
           </a:p>
         </p:txBody>
       </p:sp>
-      <mc:AlternateContent xmlns:mc="http://schemas.openxmlformats.org/markup-compatibility/2006">
-        <mc:Choice xmlns:a14="http://schemas.microsoft.com/office/drawing/2010/main" Requires="a14">
+      <mc:AlternateContent xmlns:mc="http://schemas.openxmlformats.org/markup-compatibility/2006" xmlns:a14="http://schemas.microsoft.com/office/drawing/2010/main">
+        <mc:Choice Requires="a14">
           <p:sp>
             <p:nvSpPr>
               <p:cNvPr id="16" name="TextBox 15">
@@ -4188,7 +4182,7 @@
             </p:txBody>
           </p:sp>
         </mc:Choice>
-        <mc:Fallback>
+        <mc:Fallback xmlns="">
           <p:sp>
             <p:nvSpPr>
               <p:cNvPr id="16" name="TextBox 15">

</xml_diff>